<commit_message>
Minor updates after KCDC
</commit_message>
<xml_diff>
--- a/CSPastPresentFuture.pptx
+++ b/CSPastPresentFuture.pptx
@@ -5,7 +5,7 @@
     <p:sldMasterId id="2147483672" r:id="rId1"/>
   </p:sldMasterIdLst>
   <p:notesMasterIdLst>
-    <p:notesMasterId r:id="rId10"/>
+    <p:notesMasterId r:id="rId11"/>
   </p:notesMasterIdLst>
   <p:sldIdLst>
     <p:sldId id="286" r:id="rId2"/>
@@ -14,8 +14,9 @@
     <p:sldId id="314" r:id="rId5"/>
     <p:sldId id="317" r:id="rId6"/>
     <p:sldId id="318" r:id="rId7"/>
-    <p:sldId id="263" r:id="rId8"/>
-    <p:sldId id="287" r:id="rId9"/>
+    <p:sldId id="319" r:id="rId8"/>
+    <p:sldId id="263" r:id="rId9"/>
+    <p:sldId id="287" r:id="rId10"/>
   </p:sldIdLst>
   <p:sldSz cx="12192000" cy="6858000"/>
   <p:notesSz cx="6858000" cy="9144000"/>
@@ -4640,7 +4641,7 @@
         <a:p>
           <a:r>
             <a:rPr lang="en-US" dirty="0"/>
-            <a:t>C# 9:</a:t>
+            <a:t>Top Level Statements</a:t>
           </a:r>
         </a:p>
       </dgm:t>
@@ -4693,85 +4694,6 @@
       </dgm:t>
     </dgm:pt>
     <dgm:pt modelId="{99AE02DB-E0B5-417E-9974-FF9C4B539FD3}" type="sibTrans" cxnId="{489E3D08-4CD7-41BA-8C1E-CB4DA1788484}">
-      <dgm:prSet/>
-      <dgm:spPr/>
-      <dgm:t>
-        <a:bodyPr/>
-        <a:lstStyle/>
-        <a:p>
-          <a:endParaRPr lang="en-US"/>
-        </a:p>
-      </dgm:t>
-    </dgm:pt>
-    <dgm:pt modelId="{F4983B85-03D1-43A9-BE09-E3ADA2851DE1}">
-      <dgm:prSet/>
-      <dgm:spPr/>
-      <dgm:t>
-        <a:bodyPr/>
-        <a:lstStyle/>
-        <a:p>
-          <a:r>
-            <a:rPr lang="en-US" dirty="0"/>
-            <a:t>Target Type New</a:t>
-          </a:r>
-        </a:p>
-      </dgm:t>
-    </dgm:pt>
-    <dgm:pt modelId="{B601BCC3-2640-4F4A-933B-5AF872D28298}" type="parTrans" cxnId="{C66F16D8-42E8-4DB5-B54E-C38F2635D16F}">
-      <dgm:prSet/>
-      <dgm:spPr/>
-      <dgm:t>
-        <a:bodyPr/>
-        <a:lstStyle/>
-        <a:p>
-          <a:endParaRPr lang="en-US"/>
-        </a:p>
-      </dgm:t>
-    </dgm:pt>
-    <dgm:pt modelId="{9702492F-4ED4-44DD-9726-C12E8E993787}" type="sibTrans" cxnId="{C66F16D8-42E8-4DB5-B54E-C38F2635D16F}">
-      <dgm:prSet/>
-      <dgm:spPr/>
-      <dgm:t>
-        <a:bodyPr/>
-        <a:lstStyle/>
-        <a:p>
-          <a:endParaRPr lang="en-US"/>
-        </a:p>
-      </dgm:t>
-    </dgm:pt>
-    <dgm:pt modelId="{2847F389-EFC7-4678-91B4-456F77F6A487}">
-      <dgm:prSet/>
-      <dgm:spPr/>
-      <dgm:t>
-        <a:bodyPr/>
-        <a:lstStyle/>
-        <a:p>
-          <a:r>
-            <a:rPr lang="en-US" dirty="0"/>
-            <a:t>Top Level Statements</a:t>
-          </a:r>
-          <a:br>
-            <a:rPr lang="en-US" dirty="0"/>
-          </a:br>
-          <a:r>
-            <a:rPr lang="en-US" dirty="0"/>
-            <a:t>Records</a:t>
-          </a:r>
-        </a:p>
-      </dgm:t>
-    </dgm:pt>
-    <dgm:pt modelId="{9B0F2493-2EBE-4167-AC04-5D2F9E44CB75}" type="parTrans" cxnId="{7933C3DF-8CBC-4851-A715-49731D1AA7F8}">
-      <dgm:prSet/>
-      <dgm:spPr/>
-      <dgm:t>
-        <a:bodyPr/>
-        <a:lstStyle/>
-        <a:p>
-          <a:endParaRPr lang="en-US"/>
-        </a:p>
-      </dgm:t>
-    </dgm:pt>
-    <dgm:pt modelId="{04B6AC97-9873-4B3F-8FA0-CDA76912DFAA}" type="sibTrans" cxnId="{7933C3DF-8CBC-4851-A715-49731D1AA7F8}">
       <dgm:prSet/>
       <dgm:spPr/>
       <dgm:t>
@@ -4926,26 +4848,30 @@
         </a:p>
       </dgm:t>
     </dgm:pt>
-    <dgm:pt modelId="{803DF5FC-62EC-40E9-A11C-A8AABA36E779}">
+    <dgm:pt modelId="{D2FD0874-34C4-4F7C-AF88-1F4DDB740976}">
       <dgm:prSet/>
       <dgm:spPr/>
       <dgm:t>
         <a:bodyPr/>
         <a:lstStyle/>
         <a:p>
+          <a:pPr>
+            <a:buFont typeface="Arial" panose="020B0604020202020204" pitchFamily="34" charset="0"/>
+            <a:buChar char="•"/>
+          </a:pPr>
           <a:r>
-            <a:rPr lang="en-US" dirty="0"/>
-            <a:t>Skip locals </a:t>
-          </a:r>
-          <a:r>
-            <a:rPr lang="en-US" dirty="0" err="1"/>
-            <a:t>init</a:t>
+            <a:rPr lang="en-US">
+              <a:solidFill>
+                <a:schemeClr val="bg1"/>
+              </a:solidFill>
+            </a:rPr>
+            <a:t>Target Type New</a:t>
           </a:r>
           <a:endParaRPr lang="en-US" dirty="0"/>
         </a:p>
       </dgm:t>
     </dgm:pt>
-    <dgm:pt modelId="{5D30D80F-DE18-4480-B566-A16A0CFC6F20}" type="parTrans" cxnId="{DB9264CA-22FB-40DD-A7A6-BD186ADB5FDF}">
+    <dgm:pt modelId="{2028A81E-52C5-4302-A855-635EB4FE4913}" type="parTrans" cxnId="{FDEDDEC4-008D-4B99-8CF2-A2BCF65D7CB0}">
       <dgm:prSet/>
       <dgm:spPr/>
       <dgm:t>
@@ -4956,7 +4882,7 @@
         </a:p>
       </dgm:t>
     </dgm:pt>
-    <dgm:pt modelId="{1A88D806-B3F4-4500-8035-AAF8CAE3323C}" type="sibTrans" cxnId="{DB9264CA-22FB-40DD-A7A6-BD186ADB5FDF}">
+    <dgm:pt modelId="{98755838-4C1D-4184-AC42-811DC573DE73}" type="sibTrans" cxnId="{FDEDDEC4-008D-4B99-8CF2-A2BCF65D7CB0}">
       <dgm:prSet/>
       <dgm:spPr/>
       <dgm:t>
@@ -4967,7 +4893,7 @@
         </a:p>
       </dgm:t>
     </dgm:pt>
-    <dgm:pt modelId="{C60E097D-AA76-4BF7-9C3D-8170A5E36F6C}">
+    <dgm:pt modelId="{0988BA2C-33F6-469D-ABE9-6ECDA0B19777}">
       <dgm:prSet/>
       <dgm:spPr/>
       <dgm:t>
@@ -4976,17 +4902,12 @@
         <a:p>
           <a:r>
             <a:rPr lang="en-US" dirty="0"/>
-            <a:t>Native </a:t>
+            <a:t>Records</a:t>
           </a:r>
-          <a:r>
-            <a:rPr lang="en-US" dirty="0" err="1"/>
-            <a:t>ints</a:t>
-          </a:r>
-          <a:endParaRPr lang="en-US" dirty="0"/>
         </a:p>
       </dgm:t>
     </dgm:pt>
-    <dgm:pt modelId="{45B37770-CD98-4A79-9A26-B602ECCDA6A9}" type="parTrans" cxnId="{3C3A5BAB-15B1-405B-B7B2-7AE40A3FAA18}">
+    <dgm:pt modelId="{3572250B-D2EE-492D-9015-4F209D1D714C}" type="parTrans" cxnId="{76F2C466-9278-4CD5-821D-1144500973E3}">
       <dgm:prSet/>
       <dgm:spPr/>
       <dgm:t>
@@ -4997,237 +4918,7 @@
         </a:p>
       </dgm:t>
     </dgm:pt>
-    <dgm:pt modelId="{9EA57C41-5194-4789-AB9D-E4610F7586CC}" type="sibTrans" cxnId="{3C3A5BAB-15B1-405B-B7B2-7AE40A3FAA18}">
-      <dgm:prSet/>
-      <dgm:spPr/>
-      <dgm:t>
-        <a:bodyPr/>
-        <a:lstStyle/>
-        <a:p>
-          <a:endParaRPr lang="en-US"/>
-        </a:p>
-      </dgm:t>
-    </dgm:pt>
-    <dgm:pt modelId="{317F8F53-8FE8-40E0-A447-E41E0904521F}">
-      <dgm:prSet/>
-      <dgm:spPr/>
-      <dgm:t>
-        <a:bodyPr/>
-        <a:lstStyle/>
-        <a:p>
-          <a:r>
-            <a:rPr lang="en-US" dirty="0"/>
-            <a:t>Attributes on local functions</a:t>
-          </a:r>
-        </a:p>
-      </dgm:t>
-    </dgm:pt>
-    <dgm:pt modelId="{FFFB41DA-5E14-4F71-8BE3-AB9665C0C4B7}" type="parTrans" cxnId="{359A4428-4F2E-4981-A303-A1EE0300BDC5}">
-      <dgm:prSet/>
-      <dgm:spPr/>
-      <dgm:t>
-        <a:bodyPr/>
-        <a:lstStyle/>
-        <a:p>
-          <a:endParaRPr lang="en-US"/>
-        </a:p>
-      </dgm:t>
-    </dgm:pt>
-    <dgm:pt modelId="{B49F7313-94C2-4F46-976D-1A3694221939}" type="sibTrans" cxnId="{359A4428-4F2E-4981-A303-A1EE0300BDC5}">
-      <dgm:prSet/>
-      <dgm:spPr/>
-      <dgm:t>
-        <a:bodyPr/>
-        <a:lstStyle/>
-        <a:p>
-          <a:endParaRPr lang="en-US"/>
-        </a:p>
-      </dgm:t>
-    </dgm:pt>
-    <dgm:pt modelId="{33A37AF0-BD67-478C-A1B6-CECFF7670089}">
-      <dgm:prSet/>
-      <dgm:spPr/>
-      <dgm:t>
-        <a:bodyPr/>
-        <a:lstStyle/>
-        <a:p>
-          <a:r>
-            <a:rPr lang="en-US" dirty="0"/>
-            <a:t>Function pointers</a:t>
-          </a:r>
-        </a:p>
-      </dgm:t>
-    </dgm:pt>
-    <dgm:pt modelId="{DB480371-87BE-4687-BE19-016D1B254F2D}" type="parTrans" cxnId="{EC819047-918A-4F4A-952E-1A093C85E0B6}">
-      <dgm:prSet/>
-      <dgm:spPr/>
-      <dgm:t>
-        <a:bodyPr/>
-        <a:lstStyle/>
-        <a:p>
-          <a:endParaRPr lang="en-US"/>
-        </a:p>
-      </dgm:t>
-    </dgm:pt>
-    <dgm:pt modelId="{F2A61A8C-04C5-4F78-BFD2-4DE0CCBC52C7}" type="sibTrans" cxnId="{EC819047-918A-4F4A-952E-1A093C85E0B6}">
-      <dgm:prSet/>
-      <dgm:spPr/>
-      <dgm:t>
-        <a:bodyPr/>
-        <a:lstStyle/>
-        <a:p>
-          <a:endParaRPr lang="en-US"/>
-        </a:p>
-      </dgm:t>
-    </dgm:pt>
-    <dgm:pt modelId="{DA1964D9-3681-4A2C-BC7E-0679C5C170B3}">
-      <dgm:prSet/>
-      <dgm:spPr/>
-      <dgm:t>
-        <a:bodyPr/>
-        <a:lstStyle/>
-        <a:p>
-          <a:r>
-            <a:rPr lang="en-US" dirty="0"/>
-            <a:t>Pattern matching improvements</a:t>
-          </a:r>
-        </a:p>
-      </dgm:t>
-    </dgm:pt>
-    <dgm:pt modelId="{35517268-AA21-41B7-81CD-BE857C270831}" type="parTrans" cxnId="{DBEC4A4D-3648-4227-B3BD-97D18F9AAB1B}">
-      <dgm:prSet/>
-      <dgm:spPr/>
-      <dgm:t>
-        <a:bodyPr/>
-        <a:lstStyle/>
-        <a:p>
-          <a:endParaRPr lang="en-US"/>
-        </a:p>
-      </dgm:t>
-    </dgm:pt>
-    <dgm:pt modelId="{422831EE-77C6-49D6-94A4-C278F34C6883}" type="sibTrans" cxnId="{DBEC4A4D-3648-4227-B3BD-97D18F9AAB1B}">
-      <dgm:prSet/>
-      <dgm:spPr/>
-      <dgm:t>
-        <a:bodyPr/>
-        <a:lstStyle/>
-        <a:p>
-          <a:endParaRPr lang="en-US"/>
-        </a:p>
-      </dgm:t>
-    </dgm:pt>
-    <dgm:pt modelId="{DBE08A27-5DBB-4A9D-ABF3-6EA100931741}">
-      <dgm:prSet/>
-      <dgm:spPr/>
-      <dgm:t>
-        <a:bodyPr/>
-        <a:lstStyle/>
-        <a:p>
-          <a:r>
-            <a:rPr lang="en-US" dirty="0" err="1"/>
-            <a:t>Taarget</a:t>
-          </a:r>
-          <a:r>
-            <a:rPr lang="en-US" dirty="0"/>
-            <a:t> type </a:t>
-          </a:r>
-          <a:r>
-            <a:rPr lang="en-US" dirty="0" err="1"/>
-            <a:t>conitional</a:t>
-          </a:r>
-          <a:endParaRPr lang="en-US" dirty="0"/>
-        </a:p>
-      </dgm:t>
-    </dgm:pt>
-    <dgm:pt modelId="{FA1F1546-A063-4171-8599-47B8FE0C7561}" type="parTrans" cxnId="{30CBBFBD-F867-43D1-985A-37EBAEDE355B}">
-      <dgm:prSet/>
-      <dgm:spPr/>
-      <dgm:t>
-        <a:bodyPr/>
-        <a:lstStyle/>
-        <a:p>
-          <a:endParaRPr lang="en-US"/>
-        </a:p>
-      </dgm:t>
-    </dgm:pt>
-    <dgm:pt modelId="{01F3BB34-4170-4703-9C30-2FF74E179715}" type="sibTrans" cxnId="{30CBBFBD-F867-43D1-985A-37EBAEDE355B}">
-      <dgm:prSet/>
-      <dgm:spPr/>
-      <dgm:t>
-        <a:bodyPr/>
-        <a:lstStyle/>
-        <a:p>
-          <a:endParaRPr lang="en-US"/>
-        </a:p>
-      </dgm:t>
-    </dgm:pt>
-    <dgm:pt modelId="{411FB585-30BF-48A2-BCEF-C84E708BE53E}">
-      <dgm:prSet/>
-      <dgm:spPr/>
-      <dgm:t>
-        <a:bodyPr/>
-        <a:lstStyle/>
-        <a:p>
-          <a:r>
-            <a:rPr lang="en-US" dirty="0"/>
-            <a:t>Covariant returns</a:t>
-          </a:r>
-        </a:p>
-      </dgm:t>
-    </dgm:pt>
-    <dgm:pt modelId="{55BBE039-6E9C-4FEC-A912-9CC6C70DD558}" type="parTrans" cxnId="{CF29DE29-B9C6-404C-8FB2-F8FE7854FBE7}">
-      <dgm:prSet/>
-      <dgm:spPr/>
-      <dgm:t>
-        <a:bodyPr/>
-        <a:lstStyle/>
-        <a:p>
-          <a:endParaRPr lang="en-US"/>
-        </a:p>
-      </dgm:t>
-    </dgm:pt>
-    <dgm:pt modelId="{C0129936-EF9A-4E79-8996-08653788AD2A}" type="sibTrans" cxnId="{CF29DE29-B9C6-404C-8FB2-F8FE7854FBE7}">
-      <dgm:prSet/>
-      <dgm:spPr/>
-      <dgm:t>
-        <a:bodyPr/>
-        <a:lstStyle/>
-        <a:p>
-          <a:endParaRPr lang="en-US"/>
-        </a:p>
-      </dgm:t>
-    </dgm:pt>
-    <dgm:pt modelId="{009A7F54-64A4-45C2-877D-AE62DBC51AE6}">
-      <dgm:prSet/>
-      <dgm:spPr/>
-      <dgm:t>
-        <a:bodyPr/>
-        <a:lstStyle/>
-        <a:p>
-          <a:r>
-            <a:rPr lang="en-US" dirty="0"/>
-            <a:t>Extension </a:t>
-          </a:r>
-          <a:r>
-            <a:rPr lang="en-US" dirty="0" err="1"/>
-            <a:t>GetEnumerator</a:t>
-          </a:r>
-          <a:endParaRPr lang="en-US" dirty="0"/>
-        </a:p>
-      </dgm:t>
-    </dgm:pt>
-    <dgm:pt modelId="{20C99283-3807-4390-B2A6-6BDDBE20B3DD}" type="parTrans" cxnId="{BEF102AD-6D17-4A1C-B312-C06A6A9137E2}">
-      <dgm:prSet/>
-      <dgm:spPr/>
-      <dgm:t>
-        <a:bodyPr/>
-        <a:lstStyle/>
-        <a:p>
-          <a:endParaRPr lang="en-US"/>
-        </a:p>
-      </dgm:t>
-    </dgm:pt>
-    <dgm:pt modelId="{7999BD59-D1E3-43D9-B288-EFA32084D7F7}" type="sibTrans" cxnId="{BEF102AD-6D17-4A1C-B312-C06A6A9137E2}">
+    <dgm:pt modelId="{8C921FD2-B0BD-4FD3-9D1F-726249F235AB}" type="sibTrans" cxnId="{76F2C466-9278-4CD5-821D-1144500973E3}">
       <dgm:prSet/>
       <dgm:spPr/>
       <dgm:t>
@@ -5272,37 +4963,21 @@
   </dgm:ptLst>
   <dgm:cxnLst>
     <dgm:cxn modelId="{489E3D08-4CD7-41BA-8C1E-CB4DA1788484}" srcId="{55AF256D-980F-4EAC-BDE3-A1B7BB810149}" destId="{BAD07A50-BB9B-4058-A6B8-3F500B5DC8AC}" srcOrd="6" destOrd="0" parTransId="{B05C9C49-E6D0-4DE2-9935-59A82164DF19}" sibTransId="{99AE02DB-E0B5-417E-9974-FF9C4B539FD3}"/>
-    <dgm:cxn modelId="{823F970A-7FF6-43D0-BC14-AE229433C4B1}" type="presOf" srcId="{317F8F53-8FE8-40E0-A447-E41E0904521F}" destId="{99404815-EBB5-40EA-B4FB-18C60F71A14A}" srcOrd="0" destOrd="10" presId="urn:microsoft.com/office/officeart/2005/8/layout/chevron2"/>
-    <dgm:cxn modelId="{359A4428-4F2E-4981-A303-A1EE0300BDC5}" srcId="{55AF256D-980F-4EAC-BDE3-A1B7BB810149}" destId="{317F8F53-8FE8-40E0-A447-E41E0904521F}" srcOrd="10" destOrd="0" parTransId="{FFFB41DA-5E14-4F71-8BE3-AB9665C0C4B7}" sibTransId="{B49F7313-94C2-4F46-976D-1A3694221939}"/>
-    <dgm:cxn modelId="{CF29DE29-B9C6-404C-8FB2-F8FE7854FBE7}" srcId="{55AF256D-980F-4EAC-BDE3-A1B7BB810149}" destId="{411FB585-30BF-48A2-BCEF-C84E708BE53E}" srcOrd="14" destOrd="0" parTransId="{55BBE039-6E9C-4FEC-A912-9CC6C70DD558}" sibTransId="{C0129936-EF9A-4E79-8996-08653788AD2A}"/>
+    <dgm:cxn modelId="{D054D41B-3CBB-4217-8B56-AC657F6A424B}" type="presOf" srcId="{D2FD0874-34C4-4F7C-AF88-1F4DDB740976}" destId="{99404815-EBB5-40EA-B4FB-18C60F71A14A}" srcOrd="0" destOrd="7" presId="urn:microsoft.com/office/officeart/2005/8/layout/chevron2"/>
     <dgm:cxn modelId="{0C3B6F2C-FC7D-432A-9C28-77B4A1C9C28E}" srcId="{EE40FFF8-103D-4F45-B85F-403984910D7F}" destId="{55AF256D-980F-4EAC-BDE3-A1B7BB810149}" srcOrd="0" destOrd="0" parTransId="{748A717C-599F-4C3A-B811-C08F8B1B0759}" sibTransId="{A0FA65F2-48E1-4C84-8387-4B40ABD643EF}"/>
     <dgm:cxn modelId="{BF7D8D2E-44B4-4C46-997D-194F89DCBAAA}" srcId="{55AF256D-980F-4EAC-BDE3-A1B7BB810149}" destId="{C9FBC63F-CDED-4761-96FF-FFA93DBFA544}" srcOrd="5" destOrd="0" parTransId="{F7499AFC-3320-40E9-A12C-783F414A0497}" sibTransId="{6F1021D3-47C9-42ED-A6A0-97280195F3B0}"/>
-    <dgm:cxn modelId="{0F2AC930-6BF6-40A1-9604-BA02383DBEE6}" type="presOf" srcId="{DA1964D9-3681-4A2C-BC7E-0679C5C170B3}" destId="{99404815-EBB5-40EA-B4FB-18C60F71A14A}" srcOrd="0" destOrd="12" presId="urn:microsoft.com/office/officeart/2005/8/layout/chevron2"/>
     <dgm:cxn modelId="{0103D843-07BC-46D7-B5CF-881EB1990E31}" type="presOf" srcId="{55AF256D-980F-4EAC-BDE3-A1B7BB810149}" destId="{FF38E5F5-B2ED-46F9-98AC-B8A051288B43}" srcOrd="0" destOrd="0" presId="urn:microsoft.com/office/officeart/2005/8/layout/chevron2"/>
-    <dgm:cxn modelId="{EC819047-918A-4F4A-952E-1A093C85E0B6}" srcId="{55AF256D-980F-4EAC-BDE3-A1B7BB810149}" destId="{33A37AF0-BD67-478C-A1B6-CECFF7670089}" srcOrd="11" destOrd="0" parTransId="{DB480371-87BE-4687-BE19-016D1B254F2D}" sibTransId="{F2A61A8C-04C5-4F78-BFD2-4DE0CCBC52C7}"/>
-    <dgm:cxn modelId="{DBEC4A4D-3648-4227-B3BD-97D18F9AAB1B}" srcId="{55AF256D-980F-4EAC-BDE3-A1B7BB810149}" destId="{DA1964D9-3681-4A2C-BC7E-0679C5C170B3}" srcOrd="12" destOrd="0" parTransId="{35517268-AA21-41B7-81CD-BE857C270831}" sibTransId="{422831EE-77C6-49D6-94A4-C278F34C6883}"/>
+    <dgm:cxn modelId="{76F2C466-9278-4CD5-821D-1144500973E3}" srcId="{55AF256D-980F-4EAC-BDE3-A1B7BB810149}" destId="{0988BA2C-33F6-469D-ABE9-6ECDA0B19777}" srcOrd="1" destOrd="0" parTransId="{3572250B-D2EE-492D-9015-4F209D1D714C}" sibTransId="{8C921FD2-B0BD-4FD3-9D1F-726249F235AB}"/>
     <dgm:cxn modelId="{1AE8C36E-8DF0-4CC1-B93E-246E9DA4A922}" srcId="{55AF256D-980F-4EAC-BDE3-A1B7BB810149}" destId="{3D9B7437-4B89-4763-BEAF-E9DA24406548}" srcOrd="4" destOrd="0" parTransId="{00D7B9DF-EEE2-424F-94F4-72F4315DD350}" sibTransId="{1A973A3E-417D-464F-A4A3-31C44B5CE944}"/>
     <dgm:cxn modelId="{A3561080-316C-45BC-994A-8BCC717FB0D2}" type="presOf" srcId="{9B86685F-3164-4EB7-BC23-02FF7CB9F9C4}" destId="{99404815-EBB5-40EA-B4FB-18C60F71A14A}" srcOrd="0" destOrd="3" presId="urn:microsoft.com/office/officeart/2005/8/layout/chevron2"/>
-    <dgm:cxn modelId="{30BFF28C-9406-41AA-A020-B178266AB776}" type="presOf" srcId="{2847F389-EFC7-4678-91B4-456F77F6A487}" destId="{99404815-EBB5-40EA-B4FB-18C60F71A14A}" srcOrd="0" destOrd="1" presId="urn:microsoft.com/office/officeart/2005/8/layout/chevron2"/>
     <dgm:cxn modelId="{E9A48897-FD3B-4D5C-AF4C-539633DD8EB4}" srcId="{55AF256D-980F-4EAC-BDE3-A1B7BB810149}" destId="{9B86685F-3164-4EB7-BC23-02FF7CB9F9C4}" srcOrd="3" destOrd="0" parTransId="{B85B798D-D852-4C83-8E83-2005D14494E6}" sibTransId="{A6D54504-08B1-448B-866B-AC899E52CDBE}"/>
-    <dgm:cxn modelId="{4C081A98-2553-414D-90A6-46204D2779B5}" type="presOf" srcId="{411FB585-30BF-48A2-BCEF-C84E708BE53E}" destId="{99404815-EBB5-40EA-B4FB-18C60F71A14A}" srcOrd="0" destOrd="14" presId="urn:microsoft.com/office/officeart/2005/8/layout/chevron2"/>
-    <dgm:cxn modelId="{49FE0C9C-5AA5-4739-9A64-9BC0D960FFCA}" type="presOf" srcId="{009A7F54-64A4-45C2-877D-AE62DBC51AE6}" destId="{99404815-EBB5-40EA-B4FB-18C60F71A14A}" srcOrd="0" destOrd="15" presId="urn:microsoft.com/office/officeart/2005/8/layout/chevron2"/>
     <dgm:cxn modelId="{3FEC02A6-3B33-4CA3-A1B8-B28E86AA8748}" type="presOf" srcId="{EE40FFF8-103D-4F45-B85F-403984910D7F}" destId="{C0F71877-8D45-45C6-ADEB-A07688B38294}" srcOrd="0" destOrd="0" presId="urn:microsoft.com/office/officeart/2005/8/layout/chevron2"/>
     <dgm:cxn modelId="{D57638AA-AE0F-4496-926D-933C5E25A75F}" type="presOf" srcId="{BAD07A50-BB9B-4058-A6B8-3F500B5DC8AC}" destId="{99404815-EBB5-40EA-B4FB-18C60F71A14A}" srcOrd="0" destOrd="6" presId="urn:microsoft.com/office/officeart/2005/8/layout/chevron2"/>
-    <dgm:cxn modelId="{3C3A5BAB-15B1-405B-B7B2-7AE40A3FAA18}" srcId="{55AF256D-980F-4EAC-BDE3-A1B7BB810149}" destId="{C60E097D-AA76-4BF7-9C3D-8170A5E36F6C}" srcOrd="9" destOrd="0" parTransId="{45B37770-CD98-4A79-9A26-B602ECCDA6A9}" sibTransId="{9EA57C41-5194-4789-AB9D-E4610F7586CC}"/>
-    <dgm:cxn modelId="{BEF102AD-6D17-4A1C-B312-C06A6A9137E2}" srcId="{55AF256D-980F-4EAC-BDE3-A1B7BB810149}" destId="{009A7F54-64A4-45C2-877D-AE62DBC51AE6}" srcOrd="15" destOrd="0" parTransId="{20C99283-3807-4390-B2A6-6BDDBE20B3DD}" sibTransId="{7999BD59-D1E3-43D9-B288-EFA32084D7F7}"/>
-    <dgm:cxn modelId="{CA53FEB3-9707-45B5-B77B-E67B9E244D64}" type="presOf" srcId="{DBE08A27-5DBB-4A9D-ABF3-6EA100931741}" destId="{99404815-EBB5-40EA-B4FB-18C60F71A14A}" srcOrd="0" destOrd="13" presId="urn:microsoft.com/office/officeart/2005/8/layout/chevron2"/>
     <dgm:cxn modelId="{BC1C17BC-81E7-4417-BDC2-4E24C9072DC5}" type="presOf" srcId="{F0059595-A576-4026-BD3A-1F9BB3C8BB17}" destId="{99404815-EBB5-40EA-B4FB-18C60F71A14A}" srcOrd="0" destOrd="2" presId="urn:microsoft.com/office/officeart/2005/8/layout/chevron2"/>
-    <dgm:cxn modelId="{30CBBFBD-F867-43D1-985A-37EBAEDE355B}" srcId="{55AF256D-980F-4EAC-BDE3-A1B7BB810149}" destId="{DBE08A27-5DBB-4A9D-ABF3-6EA100931741}" srcOrd="13" destOrd="0" parTransId="{FA1F1546-A063-4171-8599-47B8FE0C7561}" sibTransId="{01F3BB34-4170-4703-9C30-2FF74E179715}"/>
     <dgm:cxn modelId="{666D1BBF-240A-4EF6-8BA4-2FBEB73B37FC}" type="presOf" srcId="{C9FBC63F-CDED-4761-96FF-FFA93DBFA544}" destId="{99404815-EBB5-40EA-B4FB-18C60F71A14A}" srcOrd="0" destOrd="5" presId="urn:microsoft.com/office/officeart/2005/8/layout/chevron2"/>
-    <dgm:cxn modelId="{BA3F25C3-1BC9-47EF-ACD9-657ACC0CCA29}" type="presOf" srcId="{33A37AF0-BD67-478C-A1B6-CECFF7670089}" destId="{99404815-EBB5-40EA-B4FB-18C60F71A14A}" srcOrd="0" destOrd="11" presId="urn:microsoft.com/office/officeart/2005/8/layout/chevron2"/>
-    <dgm:cxn modelId="{DB9264CA-22FB-40DD-A7A6-BD186ADB5FDF}" srcId="{55AF256D-980F-4EAC-BDE3-A1B7BB810149}" destId="{803DF5FC-62EC-40E9-A11C-A8AABA36E779}" srcOrd="8" destOrd="0" parTransId="{5D30D80F-DE18-4480-B566-A16A0CFC6F20}" sibTransId="{1A88D806-B3F4-4500-8035-AAF8CAE3323C}"/>
-    <dgm:cxn modelId="{BCB6B2D6-67BB-4F43-97F3-6318BE4D9D43}" type="presOf" srcId="{F4983B85-03D1-43A9-BE09-E3ADA2851DE1}" destId="{99404815-EBB5-40EA-B4FB-18C60F71A14A}" srcOrd="0" destOrd="7" presId="urn:microsoft.com/office/officeart/2005/8/layout/chevron2"/>
-    <dgm:cxn modelId="{C66F16D8-42E8-4DB5-B54E-C38F2635D16F}" srcId="{55AF256D-980F-4EAC-BDE3-A1B7BB810149}" destId="{F4983B85-03D1-43A9-BE09-E3ADA2851DE1}" srcOrd="7" destOrd="0" parTransId="{B601BCC3-2640-4F4A-933B-5AF872D28298}" sibTransId="{9702492F-4ED4-44DD-9726-C12E8E993787}"/>
-    <dgm:cxn modelId="{1C526BDC-854E-4B9B-A037-E9F496F572AA}" type="presOf" srcId="{803DF5FC-62EC-40E9-A11C-A8AABA36E779}" destId="{99404815-EBB5-40EA-B4FB-18C60F71A14A}" srcOrd="0" destOrd="8" presId="urn:microsoft.com/office/officeart/2005/8/layout/chevron2"/>
+    <dgm:cxn modelId="{FDEDDEC4-008D-4B99-8CF2-A2BCF65D7CB0}" srcId="{55AF256D-980F-4EAC-BDE3-A1B7BB810149}" destId="{D2FD0874-34C4-4F7C-AF88-1F4DDB740976}" srcOrd="7" destOrd="0" parTransId="{2028A81E-52C5-4302-A855-635EB4FE4913}" sibTransId="{98755838-4C1D-4184-AC42-811DC573DE73}"/>
+    <dgm:cxn modelId="{BEAFC5CE-F9EF-44A5-A5C2-975240228F77}" type="presOf" srcId="{0988BA2C-33F6-469D-ABE9-6ECDA0B19777}" destId="{99404815-EBB5-40EA-B4FB-18C60F71A14A}" srcOrd="0" destOrd="1" presId="urn:microsoft.com/office/officeart/2005/8/layout/chevron2"/>
     <dgm:cxn modelId="{FFA0F3DE-0CC2-41C2-92C6-199856AAC9BA}" srcId="{55AF256D-980F-4EAC-BDE3-A1B7BB810149}" destId="{F0059595-A576-4026-BD3A-1F9BB3C8BB17}" srcOrd="2" destOrd="0" parTransId="{59902B44-63D8-41FC-A853-1F29959BCAC8}" sibTransId="{62DDD756-23C4-455C-AA2D-F834CE6BC506}"/>
-    <dgm:cxn modelId="{7933C3DF-8CBC-4851-A715-49731D1AA7F8}" srcId="{55AF256D-980F-4EAC-BDE3-A1B7BB810149}" destId="{2847F389-EFC7-4678-91B4-456F77F6A487}" srcOrd="1" destOrd="0" parTransId="{9B0F2493-2EBE-4167-AC04-5D2F9E44CB75}" sibTransId="{04B6AC97-9873-4B3F-8FA0-CDA76912DFAA}"/>
-    <dgm:cxn modelId="{F79315E4-1D8A-4A21-9371-8E14435DAF4E}" type="presOf" srcId="{C60E097D-AA76-4BF7-9C3D-8170A5E36F6C}" destId="{99404815-EBB5-40EA-B4FB-18C60F71A14A}" srcOrd="0" destOrd="9" presId="urn:microsoft.com/office/officeart/2005/8/layout/chevron2"/>
     <dgm:cxn modelId="{DCD357E6-3B99-4AC3-A81E-1D8E5B28EA4A}" type="presOf" srcId="{329A6205-D92F-4A22-8653-055AF4549D01}" destId="{99404815-EBB5-40EA-B4FB-18C60F71A14A}" srcOrd="0" destOrd="0" presId="urn:microsoft.com/office/officeart/2005/8/layout/chevron2"/>
     <dgm:cxn modelId="{A58080E9-33CB-4C07-920E-0A056786FE89}" srcId="{55AF256D-980F-4EAC-BDE3-A1B7BB810149}" destId="{329A6205-D92F-4A22-8653-055AF4549D01}" srcOrd="0" destOrd="0" parTransId="{BEC259D7-C0D1-4807-BF6D-B18A5084B23F}" sibTransId="{26A8870A-A98F-4E04-8A52-D7615622D8D3}"/>
     <dgm:cxn modelId="{24BCA4EA-2FC7-416D-9201-D2999F38A2E1}" type="presOf" srcId="{3D9B7437-4B89-4763-BEAF-E9DA24406548}" destId="{99404815-EBB5-40EA-B4FB-18C60F71A14A}" srcOrd="0" destOrd="4" presId="urn:microsoft.com/office/officeart/2005/8/layout/chevron2"/>
@@ -7929,12 +7604,12 @@
         <a:fontRef idx="minor"/>
       </dsp:style>
       <dsp:txBody>
-        <a:bodyPr spcFirstLastPara="0" vert="horz" wrap="square" lIns="85344" tIns="7620" rIns="7620" bIns="7620" numCol="1" spcCol="1270" anchor="ctr" anchorCtr="0">
+        <a:bodyPr spcFirstLastPara="0" vert="horz" wrap="square" lIns="184912" tIns="16510" rIns="16510" bIns="16510" numCol="1" spcCol="1270" anchor="ctr" anchorCtr="0">
           <a:noAutofit/>
         </a:bodyPr>
         <a:lstStyle/>
         <a:p>
-          <a:pPr marL="114300" lvl="1" indent="-114300" algn="l" defTabSz="533400">
+          <a:pPr marL="228600" lvl="1" indent="-228600" algn="l" defTabSz="1155700">
             <a:lnSpc>
               <a:spcPct val="90000"/>
             </a:lnSpc>
@@ -7947,12 +7622,12 @@
             <a:buChar char="•"/>
           </a:pPr>
           <a:r>
-            <a:rPr lang="en-US" sz="1200" kern="1200" dirty="0"/>
-            <a:t>C# 9:</a:t>
+            <a:rPr lang="en-US" sz="2600" kern="1200" dirty="0"/>
+            <a:t>Top Level Statements</a:t>
           </a:r>
         </a:p>
         <a:p>
-          <a:pPr marL="114300" lvl="1" indent="-114300" algn="l" defTabSz="533400">
+          <a:pPr marL="228600" lvl="1" indent="-228600" algn="l" defTabSz="1155700">
             <a:lnSpc>
               <a:spcPct val="90000"/>
             </a:lnSpc>
@@ -7965,19 +7640,12 @@
             <a:buChar char="•"/>
           </a:pPr>
           <a:r>
-            <a:rPr lang="en-US" sz="1200" kern="1200" dirty="0"/>
-            <a:t>Top Level Statements</a:t>
-          </a:r>
-          <a:br>
-            <a:rPr lang="en-US" sz="1200" kern="1200" dirty="0"/>
-          </a:br>
-          <a:r>
-            <a:rPr lang="en-US" sz="1200" kern="1200" dirty="0"/>
+            <a:rPr lang="en-US" sz="2600" kern="1200" dirty="0"/>
             <a:t>Records</a:t>
           </a:r>
         </a:p>
         <a:p>
-          <a:pPr marL="114300" lvl="1" indent="-114300" algn="l" defTabSz="533400">
+          <a:pPr marL="228600" lvl="1" indent="-228600" algn="l" defTabSz="1155700">
             <a:lnSpc>
               <a:spcPct val="90000"/>
             </a:lnSpc>
@@ -7990,12 +7658,12 @@
             <a:buChar char="•"/>
           </a:pPr>
           <a:r>
-            <a:rPr lang="en-US" sz="1200" kern="1200" dirty="0"/>
+            <a:rPr lang="en-US" sz="2600" kern="1200" dirty="0"/>
             <a:t>Code Generators</a:t>
           </a:r>
         </a:p>
         <a:p>
-          <a:pPr marL="114300" lvl="1" indent="-114300" algn="l" defTabSz="533400">
+          <a:pPr marL="228600" lvl="1" indent="-228600" algn="l" defTabSz="1155700">
             <a:lnSpc>
               <a:spcPct val="90000"/>
             </a:lnSpc>
@@ -8008,12 +7676,12 @@
             <a:buChar char="•"/>
           </a:pPr>
           <a:r>
-            <a:rPr lang="en-US" sz="1200" kern="1200" dirty="0"/>
+            <a:rPr lang="en-US" sz="2600" kern="1200" dirty="0"/>
             <a:t>Lambda discards</a:t>
           </a:r>
         </a:p>
         <a:p>
-          <a:pPr marL="114300" lvl="1" indent="-114300" algn="l" defTabSz="533400">
+          <a:pPr marL="228600" lvl="1" indent="-228600" algn="l" defTabSz="1155700">
             <a:lnSpc>
               <a:spcPct val="90000"/>
             </a:lnSpc>
@@ -8026,12 +7694,12 @@
             <a:buChar char="•"/>
           </a:pPr>
           <a:r>
-            <a:rPr lang="en-US" sz="1200" kern="1200" dirty="0"/>
+            <a:rPr lang="en-US" sz="2600" kern="1200" dirty="0"/>
             <a:t>Static lambdas</a:t>
           </a:r>
         </a:p>
         <a:p>
-          <a:pPr marL="114300" lvl="1" indent="-114300" algn="l" defTabSz="533400">
+          <a:pPr marL="228600" lvl="1" indent="-228600" algn="l" defTabSz="1155700">
             <a:lnSpc>
               <a:spcPct val="90000"/>
             </a:lnSpc>
@@ -8044,12 +7712,12 @@
             <a:buChar char="•"/>
           </a:pPr>
           <a:r>
-            <a:rPr lang="en-US" sz="1200" kern="1200" dirty="0"/>
+            <a:rPr lang="en-US" sz="2600" kern="1200" dirty="0"/>
             <a:t>Module Initializers</a:t>
           </a:r>
         </a:p>
         <a:p>
-          <a:pPr marL="114300" lvl="1" indent="-114300" algn="l" defTabSz="533400">
+          <a:pPr marL="228600" lvl="1" indent="-228600" algn="l" defTabSz="1155700">
             <a:lnSpc>
               <a:spcPct val="90000"/>
             </a:lnSpc>
@@ -8062,12 +7730,12 @@
             <a:buChar char="•"/>
           </a:pPr>
           <a:r>
-            <a:rPr lang="en-US" sz="1200" kern="1200" dirty="0"/>
+            <a:rPr lang="en-US" sz="2600" kern="1200" dirty="0"/>
             <a:t>Extending Partial</a:t>
           </a:r>
         </a:p>
         <a:p>
-          <a:pPr marL="114300" lvl="1" indent="-114300" algn="l" defTabSz="533400">
+          <a:pPr marL="228600" lvl="1" indent="-228600" algn="l" defTabSz="1155700">
             <a:lnSpc>
               <a:spcPct val="90000"/>
             </a:lnSpc>
@@ -8077,180 +7745,18 @@
             <a:spcAft>
               <a:spcPct val="15000"/>
             </a:spcAft>
+            <a:buFont typeface="Arial" panose="020B0604020202020204" pitchFamily="34" charset="0"/>
             <a:buChar char="•"/>
           </a:pPr>
           <a:r>
-            <a:rPr lang="en-US" sz="1200" kern="1200" dirty="0"/>
+            <a:rPr lang="en-US" sz="2600" kern="1200">
+              <a:solidFill>
+                <a:schemeClr val="bg1"/>
+              </a:solidFill>
+            </a:rPr>
             <a:t>Target Type New</a:t>
           </a:r>
-        </a:p>
-        <a:p>
-          <a:pPr marL="114300" lvl="1" indent="-114300" algn="l" defTabSz="533400">
-            <a:lnSpc>
-              <a:spcPct val="90000"/>
-            </a:lnSpc>
-            <a:spcBef>
-              <a:spcPct val="0"/>
-            </a:spcBef>
-            <a:spcAft>
-              <a:spcPct val="15000"/>
-            </a:spcAft>
-            <a:buChar char="•"/>
-          </a:pPr>
-          <a:r>
-            <a:rPr lang="en-US" sz="1200" kern="1200" dirty="0"/>
-            <a:t>Skip locals </a:t>
-          </a:r>
-          <a:r>
-            <a:rPr lang="en-US" sz="1200" kern="1200" dirty="0" err="1"/>
-            <a:t>init</a:t>
-          </a:r>
-          <a:endParaRPr lang="en-US" sz="1200" kern="1200" dirty="0"/>
-        </a:p>
-        <a:p>
-          <a:pPr marL="114300" lvl="1" indent="-114300" algn="l" defTabSz="533400">
-            <a:lnSpc>
-              <a:spcPct val="90000"/>
-            </a:lnSpc>
-            <a:spcBef>
-              <a:spcPct val="0"/>
-            </a:spcBef>
-            <a:spcAft>
-              <a:spcPct val="15000"/>
-            </a:spcAft>
-            <a:buChar char="•"/>
-          </a:pPr>
-          <a:r>
-            <a:rPr lang="en-US" sz="1200" kern="1200" dirty="0"/>
-            <a:t>Native </a:t>
-          </a:r>
-          <a:r>
-            <a:rPr lang="en-US" sz="1200" kern="1200" dirty="0" err="1"/>
-            <a:t>ints</a:t>
-          </a:r>
-          <a:endParaRPr lang="en-US" sz="1200" kern="1200" dirty="0"/>
-        </a:p>
-        <a:p>
-          <a:pPr marL="114300" lvl="1" indent="-114300" algn="l" defTabSz="533400">
-            <a:lnSpc>
-              <a:spcPct val="90000"/>
-            </a:lnSpc>
-            <a:spcBef>
-              <a:spcPct val="0"/>
-            </a:spcBef>
-            <a:spcAft>
-              <a:spcPct val="15000"/>
-            </a:spcAft>
-            <a:buChar char="•"/>
-          </a:pPr>
-          <a:r>
-            <a:rPr lang="en-US" sz="1200" kern="1200" dirty="0"/>
-            <a:t>Attributes on local functions</a:t>
-          </a:r>
-        </a:p>
-        <a:p>
-          <a:pPr marL="114300" lvl="1" indent="-114300" algn="l" defTabSz="533400">
-            <a:lnSpc>
-              <a:spcPct val="90000"/>
-            </a:lnSpc>
-            <a:spcBef>
-              <a:spcPct val="0"/>
-            </a:spcBef>
-            <a:spcAft>
-              <a:spcPct val="15000"/>
-            </a:spcAft>
-            <a:buChar char="•"/>
-          </a:pPr>
-          <a:r>
-            <a:rPr lang="en-US" sz="1200" kern="1200" dirty="0"/>
-            <a:t>Function pointers</a:t>
-          </a:r>
-        </a:p>
-        <a:p>
-          <a:pPr marL="114300" lvl="1" indent="-114300" algn="l" defTabSz="533400">
-            <a:lnSpc>
-              <a:spcPct val="90000"/>
-            </a:lnSpc>
-            <a:spcBef>
-              <a:spcPct val="0"/>
-            </a:spcBef>
-            <a:spcAft>
-              <a:spcPct val="15000"/>
-            </a:spcAft>
-            <a:buChar char="•"/>
-          </a:pPr>
-          <a:r>
-            <a:rPr lang="en-US" sz="1200" kern="1200" dirty="0"/>
-            <a:t>Pattern matching improvements</a:t>
-          </a:r>
-        </a:p>
-        <a:p>
-          <a:pPr marL="114300" lvl="1" indent="-114300" algn="l" defTabSz="533400">
-            <a:lnSpc>
-              <a:spcPct val="90000"/>
-            </a:lnSpc>
-            <a:spcBef>
-              <a:spcPct val="0"/>
-            </a:spcBef>
-            <a:spcAft>
-              <a:spcPct val="15000"/>
-            </a:spcAft>
-            <a:buChar char="•"/>
-          </a:pPr>
-          <a:r>
-            <a:rPr lang="en-US" sz="1200" kern="1200" dirty="0" err="1"/>
-            <a:t>Taarget</a:t>
-          </a:r>
-          <a:r>
-            <a:rPr lang="en-US" sz="1200" kern="1200" dirty="0"/>
-            <a:t> type </a:t>
-          </a:r>
-          <a:r>
-            <a:rPr lang="en-US" sz="1200" kern="1200" dirty="0" err="1"/>
-            <a:t>conitional</a:t>
-          </a:r>
-          <a:endParaRPr lang="en-US" sz="1200" kern="1200" dirty="0"/>
-        </a:p>
-        <a:p>
-          <a:pPr marL="114300" lvl="1" indent="-114300" algn="l" defTabSz="533400">
-            <a:lnSpc>
-              <a:spcPct val="90000"/>
-            </a:lnSpc>
-            <a:spcBef>
-              <a:spcPct val="0"/>
-            </a:spcBef>
-            <a:spcAft>
-              <a:spcPct val="15000"/>
-            </a:spcAft>
-            <a:buChar char="•"/>
-          </a:pPr>
-          <a:r>
-            <a:rPr lang="en-US" sz="1200" kern="1200" dirty="0"/>
-            <a:t>Covariant returns</a:t>
-          </a:r>
-        </a:p>
-        <a:p>
-          <a:pPr marL="114300" lvl="1" indent="-114300" algn="l" defTabSz="533400">
-            <a:lnSpc>
-              <a:spcPct val="90000"/>
-            </a:lnSpc>
-            <a:spcBef>
-              <a:spcPct val="0"/>
-            </a:spcBef>
-            <a:spcAft>
-              <a:spcPct val="15000"/>
-            </a:spcAft>
-            <a:buChar char="•"/>
-          </a:pPr>
-          <a:r>
-            <a:rPr lang="en-US" sz="1200" kern="1200" dirty="0"/>
-            <a:t>Extension </a:t>
-          </a:r>
-          <a:r>
-            <a:rPr lang="en-US" sz="1200" kern="1200" dirty="0" err="1"/>
-            <a:t>GetEnumerator</a:t>
-          </a:r>
-          <a:endParaRPr lang="en-US" sz="1200" kern="1200" dirty="0"/>
+          <a:endParaRPr lang="en-US" sz="2600" kern="1200" dirty="0"/>
         </a:p>
       </dsp:txBody>
       <dsp:txXfrm rot="-5400000">
@@ -13826,7 +13332,7 @@
           <a:p>
             <a:fld id="{FC81B089-160E-404A-8C73-8674F1782EA4}" type="datetimeFigureOut">
               <a:rPr lang="en-US" smtClean="0"/>
-              <a:t>9/12/2021</a:t>
+              <a:t>9/17/2021</a:t>
             </a:fld>
             <a:endParaRPr lang="en-US"/>
           </a:p>
@@ -16894,7 +16400,7 @@
           <a:p>
             <a:fld id="{D2B62928-2648-4210-B25C-2BD7B5FE2C7B}" type="datetimeFigureOut">
               <a:rPr lang="en-US" smtClean="0"/>
-              <a:t>9/12/2021</a:t>
+              <a:t>9/17/2021</a:t>
             </a:fld>
             <a:endParaRPr lang="en-US"/>
           </a:p>
@@ -17405,7 +16911,7 @@
           <a:p>
             <a:fld id="{D2B62928-2648-4210-B25C-2BD7B5FE2C7B}" type="datetimeFigureOut">
               <a:rPr lang="en-US" smtClean="0"/>
-              <a:t>9/12/2021</a:t>
+              <a:t>9/17/2021</a:t>
             </a:fld>
             <a:endParaRPr lang="en-US"/>
           </a:p>
@@ -17578,7 +17084,7 @@
           <a:p>
             <a:fld id="{D2B62928-2648-4210-B25C-2BD7B5FE2C7B}" type="datetimeFigureOut">
               <a:rPr lang="en-US" smtClean="0"/>
-              <a:t>9/12/2021</a:t>
+              <a:t>9/17/2021</a:t>
             </a:fld>
             <a:endParaRPr lang="en-US"/>
           </a:p>
@@ -17742,7 +17248,7 @@
           <a:p>
             <a:fld id="{D2B62928-2648-4210-B25C-2BD7B5FE2C7B}" type="datetimeFigureOut">
               <a:rPr lang="en-US" smtClean="0"/>
-              <a:t>9/12/2021</a:t>
+              <a:t>9/17/2021</a:t>
             </a:fld>
             <a:endParaRPr lang="en-US"/>
           </a:p>
@@ -20865,7 +20371,7 @@
           <a:p>
             <a:fld id="{D2B62928-2648-4210-B25C-2BD7B5FE2C7B}" type="datetimeFigureOut">
               <a:rPr lang="en-US" smtClean="0"/>
-              <a:t>9/12/2021</a:t>
+              <a:t>9/17/2021</a:t>
             </a:fld>
             <a:endParaRPr lang="en-US"/>
           </a:p>
@@ -21145,7 +20651,7 @@
           <a:p>
             <a:fld id="{D2B62928-2648-4210-B25C-2BD7B5FE2C7B}" type="datetimeFigureOut">
               <a:rPr lang="en-US" smtClean="0"/>
-              <a:t>9/12/2021</a:t>
+              <a:t>9/17/2021</a:t>
             </a:fld>
             <a:endParaRPr lang="en-US"/>
           </a:p>
@@ -21559,7 +21065,7 @@
           <a:p>
             <a:fld id="{D2B62928-2648-4210-B25C-2BD7B5FE2C7B}" type="datetimeFigureOut">
               <a:rPr lang="en-US" smtClean="0"/>
-              <a:t>9/12/2021</a:t>
+              <a:t>9/17/2021</a:t>
             </a:fld>
             <a:endParaRPr lang="en-US"/>
           </a:p>
@@ -21671,7 +21177,7 @@
           <a:p>
             <a:fld id="{D2B62928-2648-4210-B25C-2BD7B5FE2C7B}" type="datetimeFigureOut">
               <a:rPr lang="en-US" smtClean="0"/>
-              <a:t>9/12/2021</a:t>
+              <a:t>9/17/2021</a:t>
             </a:fld>
             <a:endParaRPr lang="en-US"/>
           </a:p>
@@ -21761,7 +21267,7 @@
           <a:p>
             <a:fld id="{D2B62928-2648-4210-B25C-2BD7B5FE2C7B}" type="datetimeFigureOut">
               <a:rPr lang="en-US" smtClean="0"/>
-              <a:t>9/12/2021</a:t>
+              <a:t>9/17/2021</a:t>
             </a:fld>
             <a:endParaRPr lang="en-US"/>
           </a:p>
@@ -21936,7 +21442,7 @@
           <a:p>
             <a:fld id="{D2B62928-2648-4210-B25C-2BD7B5FE2C7B}" type="datetimeFigureOut">
               <a:rPr lang="en-US" smtClean="0"/>
-              <a:t>9/12/2021</a:t>
+              <a:t>9/17/2021</a:t>
             </a:fld>
             <a:endParaRPr lang="en-US"/>
           </a:p>
@@ -22421,7 +21927,7 @@
           <a:p>
             <a:fld id="{D2B62928-2648-4210-B25C-2BD7B5FE2C7B}" type="datetimeFigureOut">
               <a:rPr lang="en-US" smtClean="0"/>
-              <a:t>9/12/2021</a:t>
+              <a:t>9/17/2021</a:t>
             </a:fld>
             <a:endParaRPr lang="en-US"/>
           </a:p>
@@ -22973,7 +22479,7 @@
           <a:p>
             <a:fld id="{D2B62928-2648-4210-B25C-2BD7B5FE2C7B}" type="datetimeFigureOut">
               <a:rPr lang="en-US" smtClean="0"/>
-              <a:t>9/12/2021</a:t>
+              <a:t>9/17/2021</a:t>
             </a:fld>
             <a:endParaRPr lang="en-US"/>
           </a:p>
@@ -23477,13 +22983,13 @@
               </a:rPr>
             </a:br>
             <a:r>
-              <a:rPr lang="en-US" dirty="0">
+              <a:rPr lang="en-US" sz="3600" dirty="0">
                 <a:solidFill>
                   <a:schemeClr val="tx1"/>
                 </a:solidFill>
-                <a:hlinkClick r:id="rId3"/>
+                <a:latin typeface="Segoe UI" panose="020B0502040204020203" pitchFamily="34" charset="0"/>
               </a:rPr>
-              <a:t>https://github.com/jwooley/RoslynAndYou</a:t>
+              <a:t>https://github.com/jwooley/CSVersions</a:t>
             </a:r>
             <a:br>
               <a:rPr lang="en-US" dirty="0">
@@ -23497,17 +23003,8 @@
                 <a:solidFill>
                   <a:schemeClr val="tx1"/>
                 </a:solidFill>
-                <a:hlinkClick r:id="rId4"/>
               </a:rPr>
-              <a:t>https://jwooley.github.io/</a:t>
-            </a:r>
-            <a:r>
-              <a:rPr lang="en-US" dirty="0">
-                <a:solidFill>
-                  <a:schemeClr val="tx1"/>
-                </a:solidFill>
-              </a:rPr>
-              <a:t> </a:t>
+              <a:t>https://jwooley.github.io/ </a:t>
             </a:r>
           </a:p>
         </p:txBody>
@@ -23521,7 +23018,7 @@
           <p:nvPr/>
         </p:nvPicPr>
         <p:blipFill>
-          <a:blip r:embed="rId5" cstate="print">
+          <a:blip r:embed="rId3" cstate="print">
             <a:extLst>
               <a:ext uri="{28A0092B-C50C-407E-A947-70E740481C1C}">
                 <a14:useLocalDpi xmlns:a14="http://schemas.microsoft.com/office/drawing/2010/main" val="0"/>
@@ -23562,7 +23059,7 @@
           <p:nvPr/>
         </p:nvPicPr>
         <p:blipFill>
-          <a:blip r:embed="rId6">
+          <a:blip r:embed="rId4">
             <a:extLst>
               <a:ext uri="{28A0092B-C50C-407E-A947-70E740481C1C}">
                 <a14:useLocalDpi xmlns:a14="http://schemas.microsoft.com/office/drawing/2010/main" val="0"/>
@@ -23843,6 +23340,36 @@
           </a:p>
         </p:txBody>
       </p:sp>
+      <p:pic>
+        <p:nvPicPr>
+          <p:cNvPr id="10" name="Picture 9">
+            <a:extLst>
+              <a:ext uri="{FF2B5EF4-FFF2-40B4-BE49-F238E27FC236}">
+                <a16:creationId xmlns:a16="http://schemas.microsoft.com/office/drawing/2014/main" id="{3CB934DF-A375-4CF4-9006-A23354D7231E}"/>
+              </a:ext>
+            </a:extLst>
+          </p:cNvPr>
+          <p:cNvPicPr>
+            <a:picLocks noChangeAspect="1"/>
+          </p:cNvPicPr>
+          <p:nvPr/>
+        </p:nvPicPr>
+        <p:blipFill>
+          <a:blip r:embed="rId5"/>
+          <a:stretch>
+            <a:fillRect/>
+          </a:stretch>
+        </p:blipFill>
+        <p:spPr>
+          <a:xfrm>
+            <a:off x="228600" y="272532"/>
+            <a:ext cx="1447925" cy="1493649"/>
+          </a:xfrm>
+          <a:prstGeom prst="rect">
+            <a:avLst/>
+          </a:prstGeom>
+        </p:spPr>
+      </p:pic>
     </p:spTree>
     <p:extLst>
       <p:ext uri="{BB962C8B-B14F-4D97-AF65-F5344CB8AC3E}">
@@ -31414,7 +30941,7 @@
           <p:nvPr>
             <p:extLst>
               <p:ext uri="{D42A27DB-BD31-4B8C-83A1-F6EECF244321}">
-                <p14:modId xmlns:p14="http://schemas.microsoft.com/office/powerpoint/2010/main" val="855142015"/>
+                <p14:modId xmlns:p14="http://schemas.microsoft.com/office/powerpoint/2010/main" val="1124531836"/>
               </p:ext>
             </p:extLst>
           </p:nvPr>
@@ -31494,6 +31021,189 @@
               <a:rPr lang="en-US" sz="2400" dirty="0"/>
               <a:t>https://github.com/dotnet/roslyn/blob/master/docs/Language%20Feature%20Status.md</a:t>
             </a:r>
+          </a:p>
+        </p:txBody>
+      </p:sp>
+      <p:sp>
+        <p:nvSpPr>
+          <p:cNvPr id="7" name="TextBox 6">
+            <a:extLst>
+              <a:ext uri="{FF2B5EF4-FFF2-40B4-BE49-F238E27FC236}">
+                <a16:creationId xmlns:a16="http://schemas.microsoft.com/office/drawing/2014/main" id="{B078C727-5FBF-4BAA-BAF4-B3DED558F212}"/>
+              </a:ext>
+            </a:extLst>
+          </p:cNvPr>
+          <p:cNvSpPr txBox="1"/>
+          <p:nvPr/>
+        </p:nvSpPr>
+        <p:spPr>
+          <a:xfrm>
+            <a:off x="7687902" y="1295400"/>
+            <a:ext cx="4263218" cy="3416320"/>
+          </a:xfrm>
+          <a:prstGeom prst="rect">
+            <a:avLst/>
+          </a:prstGeom>
+          <a:noFill/>
+        </p:spPr>
+        <p:txBody>
+          <a:bodyPr wrap="none" rtlCol="0">
+            <a:spAutoFit/>
+          </a:bodyPr>
+          <a:lstStyle/>
+          <a:p>
+            <a:pPr marL="285750" lvl="0" indent="-285750">
+              <a:buFont typeface="Arial" panose="020B0604020202020204" pitchFamily="34" charset="0"/>
+              <a:buChar char="•"/>
+            </a:pPr>
+            <a:r>
+              <a:rPr lang="en-US" sz="2400" dirty="0">
+                <a:solidFill>
+                  <a:schemeClr val="bg1"/>
+                </a:solidFill>
+              </a:rPr>
+              <a:t>Skip locals </a:t>
+            </a:r>
+            <a:r>
+              <a:rPr lang="en-US" sz="2400" dirty="0" err="1">
+                <a:solidFill>
+                  <a:schemeClr val="bg1"/>
+                </a:solidFill>
+              </a:rPr>
+              <a:t>init</a:t>
+            </a:r>
+            <a:endParaRPr lang="en-US" sz="2400" dirty="0">
+              <a:solidFill>
+                <a:schemeClr val="bg1"/>
+              </a:solidFill>
+            </a:endParaRPr>
+          </a:p>
+          <a:p>
+            <a:pPr marL="285750" lvl="0" indent="-285750">
+              <a:buFont typeface="Arial" panose="020B0604020202020204" pitchFamily="34" charset="0"/>
+              <a:buChar char="•"/>
+            </a:pPr>
+            <a:r>
+              <a:rPr lang="en-US" sz="2400" dirty="0">
+                <a:solidFill>
+                  <a:schemeClr val="bg1"/>
+                </a:solidFill>
+              </a:rPr>
+              <a:t>Native </a:t>
+            </a:r>
+            <a:r>
+              <a:rPr lang="en-US" sz="2400" dirty="0" err="1">
+                <a:solidFill>
+                  <a:schemeClr val="bg1"/>
+                </a:solidFill>
+              </a:rPr>
+              <a:t>ints</a:t>
+            </a:r>
+            <a:endParaRPr lang="en-US" sz="2400" dirty="0">
+              <a:solidFill>
+                <a:schemeClr val="bg1"/>
+              </a:solidFill>
+            </a:endParaRPr>
+          </a:p>
+          <a:p>
+            <a:pPr marL="285750" lvl="0" indent="-285750">
+              <a:buFont typeface="Arial" panose="020B0604020202020204" pitchFamily="34" charset="0"/>
+              <a:buChar char="•"/>
+            </a:pPr>
+            <a:r>
+              <a:rPr lang="en-US" sz="2400" dirty="0">
+                <a:solidFill>
+                  <a:schemeClr val="bg1"/>
+                </a:solidFill>
+              </a:rPr>
+              <a:t>Attributes on local functions</a:t>
+            </a:r>
+          </a:p>
+          <a:p>
+            <a:pPr marL="285750" lvl="0" indent="-285750">
+              <a:buFont typeface="Arial" panose="020B0604020202020204" pitchFamily="34" charset="0"/>
+              <a:buChar char="•"/>
+            </a:pPr>
+            <a:r>
+              <a:rPr lang="en-US" sz="2400" dirty="0">
+                <a:solidFill>
+                  <a:schemeClr val="bg1"/>
+                </a:solidFill>
+              </a:rPr>
+              <a:t>Function pointers</a:t>
+            </a:r>
+          </a:p>
+          <a:p>
+            <a:pPr marL="285750" lvl="0" indent="-285750">
+              <a:buFont typeface="Arial" panose="020B0604020202020204" pitchFamily="34" charset="0"/>
+              <a:buChar char="•"/>
+            </a:pPr>
+            <a:r>
+              <a:rPr lang="en-US" sz="2400" dirty="0">
+                <a:solidFill>
+                  <a:schemeClr val="bg1"/>
+                </a:solidFill>
+              </a:rPr>
+              <a:t>Pattern matching improvements</a:t>
+            </a:r>
+          </a:p>
+          <a:p>
+            <a:pPr marL="285750" lvl="0" indent="-285750">
+              <a:buFont typeface="Arial" panose="020B0604020202020204" pitchFamily="34" charset="0"/>
+              <a:buChar char="•"/>
+            </a:pPr>
+            <a:r>
+              <a:rPr lang="en-US" sz="2400" dirty="0">
+                <a:solidFill>
+                  <a:schemeClr val="bg1"/>
+                </a:solidFill>
+              </a:rPr>
+              <a:t>Target type conditional</a:t>
+            </a:r>
+          </a:p>
+          <a:p>
+            <a:pPr marL="285750" lvl="0" indent="-285750">
+              <a:buFont typeface="Arial" panose="020B0604020202020204" pitchFamily="34" charset="0"/>
+              <a:buChar char="•"/>
+            </a:pPr>
+            <a:r>
+              <a:rPr lang="en-US" sz="2400" dirty="0">
+                <a:solidFill>
+                  <a:schemeClr val="bg1"/>
+                </a:solidFill>
+              </a:rPr>
+              <a:t>Covariant returns</a:t>
+            </a:r>
+          </a:p>
+          <a:p>
+            <a:pPr marL="285750" lvl="0" indent="-285750">
+              <a:buFont typeface="Arial" panose="020B0604020202020204" pitchFamily="34" charset="0"/>
+              <a:buChar char="•"/>
+            </a:pPr>
+            <a:r>
+              <a:rPr lang="en-US" sz="2400" dirty="0">
+                <a:solidFill>
+                  <a:schemeClr val="bg1"/>
+                </a:solidFill>
+              </a:rPr>
+              <a:t>Extension </a:t>
+            </a:r>
+            <a:r>
+              <a:rPr lang="en-US" sz="2400" dirty="0" err="1">
+                <a:solidFill>
+                  <a:schemeClr val="bg1"/>
+                </a:solidFill>
+              </a:rPr>
+              <a:t>GetEnumerator</a:t>
+            </a:r>
+            <a:endParaRPr lang="en-US" sz="2400" dirty="0">
+              <a:solidFill>
+                <a:schemeClr val="bg1"/>
+              </a:solidFill>
+            </a:endParaRPr>
+          </a:p>
+          <a:p>
+            <a:endParaRPr lang="en-US" sz="2400" dirty="0"/>
           </a:p>
         </p:txBody>
       </p:sp>
@@ -31676,6 +31386,167 @@
       </p:grpSpPr>
       <p:sp>
         <p:nvSpPr>
+          <p:cNvPr id="2" name="Title 1">
+            <a:extLst>
+              <a:ext uri="{FF2B5EF4-FFF2-40B4-BE49-F238E27FC236}">
+                <a16:creationId xmlns:a16="http://schemas.microsoft.com/office/drawing/2014/main" id="{036A813A-9010-4D99-890D-4186FF7570F1}"/>
+              </a:ext>
+            </a:extLst>
+          </p:cNvPr>
+          <p:cNvSpPr>
+            <a:spLocks noGrp="1"/>
+          </p:cNvSpPr>
+          <p:nvPr>
+            <p:ph type="title"/>
+          </p:nvPr>
+        </p:nvSpPr>
+        <p:spPr/>
+        <p:txBody>
+          <a:bodyPr/>
+          <a:lstStyle/>
+          <a:p>
+            <a:r>
+              <a:rPr lang="en-US" dirty="0"/>
+              <a:t>Source Generators</a:t>
+            </a:r>
+          </a:p>
+        </p:txBody>
+      </p:sp>
+      <p:sp>
+        <p:nvSpPr>
+          <p:cNvPr id="3" name="Content Placeholder 2">
+            <a:extLst>
+              <a:ext uri="{FF2B5EF4-FFF2-40B4-BE49-F238E27FC236}">
+                <a16:creationId xmlns:a16="http://schemas.microsoft.com/office/drawing/2014/main" id="{19CE1827-E58C-4A5E-8D7C-44812CD21A11}"/>
+              </a:ext>
+            </a:extLst>
+          </p:cNvPr>
+          <p:cNvSpPr>
+            <a:spLocks noGrp="1"/>
+          </p:cNvSpPr>
+          <p:nvPr>
+            <p:ph idx="1"/>
+          </p:nvPr>
+        </p:nvSpPr>
+        <p:spPr>
+          <a:solidFill>
+            <a:schemeClr val="tx1"/>
+          </a:solidFill>
+        </p:spPr>
+        <p:txBody>
+          <a:bodyPr/>
+          <a:lstStyle/>
+          <a:p>
+            <a:r>
+              <a:rPr lang="en-US" dirty="0">
+                <a:solidFill>
+                  <a:schemeClr val="bg1"/>
+                </a:solidFill>
+              </a:rPr>
+              <a:t>Docs</a:t>
+            </a:r>
+            <a:br>
+              <a:rPr lang="en-US" dirty="0"/>
+            </a:br>
+            <a:r>
+              <a:rPr lang="en-US" dirty="0">
+                <a:hlinkClick r:id="rId2"/>
+              </a:rPr>
+              <a:t>https://docs.microsoft.com/en-us/dotnet/csharp/roslyn-sdk/source-generators-overview</a:t>
+            </a:r>
+            <a:r>
+              <a:rPr lang="en-US" dirty="0"/>
+              <a:t> </a:t>
+            </a:r>
+          </a:p>
+          <a:p>
+            <a:r>
+              <a:rPr lang="en-US" dirty="0">
+                <a:solidFill>
+                  <a:schemeClr val="bg1"/>
+                </a:solidFill>
+              </a:rPr>
+              <a:t>Samples:</a:t>
+            </a:r>
+            <a:br>
+              <a:rPr lang="en-US" dirty="0"/>
+            </a:br>
+            <a:r>
+              <a:rPr lang="en-US" dirty="0"/>
+              <a:t> </a:t>
+            </a:r>
+            <a:r>
+              <a:rPr lang="en-US" dirty="0">
+                <a:hlinkClick r:id="rId3"/>
+              </a:rPr>
+              <a:t>https://github.com/dotnet/roslyn-sdk/tree/main/samples/CSharp/SourceGenerators</a:t>
+            </a:r>
+            <a:r>
+              <a:rPr lang="en-US" dirty="0"/>
+              <a:t> </a:t>
+            </a:r>
+          </a:p>
+          <a:p>
+            <a:r>
+              <a:rPr lang="en-US" dirty="0">
+                <a:solidFill>
+                  <a:schemeClr val="bg1"/>
+                </a:solidFill>
+              </a:rPr>
+              <a:t>Cookbook:</a:t>
+            </a:r>
+            <a:br>
+              <a:rPr lang="en-US" dirty="0"/>
+            </a:br>
+            <a:r>
+              <a:rPr lang="en-US" dirty="0"/>
+              <a:t> </a:t>
+            </a:r>
+            <a:r>
+              <a:rPr lang="en-US" dirty="0">
+                <a:hlinkClick r:id="rId4"/>
+              </a:rPr>
+              <a:t>https://github.com/dotnet/roslyn/blob/main/docs/features/source-generators.cookbook.md</a:t>
+            </a:r>
+            <a:r>
+              <a:rPr lang="en-US" dirty="0"/>
+              <a:t> </a:t>
+            </a:r>
+          </a:p>
+        </p:txBody>
+      </p:sp>
+    </p:spTree>
+    <p:extLst>
+      <p:ext uri="{BB962C8B-B14F-4D97-AF65-F5344CB8AC3E}">
+        <p14:creationId xmlns:p14="http://schemas.microsoft.com/office/powerpoint/2010/main" val="8947122"/>
+      </p:ext>
+    </p:extLst>
+  </p:cSld>
+  <p:clrMapOvr>
+    <a:masterClrMapping/>
+  </p:clrMapOvr>
+</p:sld>
+</file>
+
+<file path=ppt/slides/slide8.xml><?xml version="1.0" encoding="utf-8"?>
+<p:sld xmlns:a="http://schemas.openxmlformats.org/drawingml/2006/main" xmlns:r="http://schemas.openxmlformats.org/officeDocument/2006/relationships" xmlns:p="http://schemas.openxmlformats.org/presentationml/2006/main">
+  <p:cSld>
+    <p:spTree>
+      <p:nvGrpSpPr>
+        <p:cNvPr id="1" name=""/>
+        <p:cNvGrpSpPr/>
+        <p:nvPr/>
+      </p:nvGrpSpPr>
+      <p:grpSpPr>
+        <a:xfrm>
+          <a:off x="0" y="0"/>
+          <a:ext cx="0" cy="0"/>
+          <a:chOff x="0" y="0"/>
+          <a:chExt cx="0" cy="0"/>
+        </a:xfrm>
+      </p:grpSpPr>
+      <p:sp>
+        <p:nvSpPr>
           <p:cNvPr id="2" name="Title 1"/>
           <p:cNvSpPr>
             <a:spLocks noGrp="1"/>
@@ -31708,9 +31579,7 @@
         </p:nvSpPr>
         <p:spPr>
           <a:solidFill>
-            <a:schemeClr val="tx1">
-              <a:lumMod val="85000"/>
-            </a:schemeClr>
+            <a:schemeClr val="tx1"/>
           </a:solidFill>
         </p:spPr>
         <p:txBody>
@@ -32000,7 +31869,7 @@
                 </a:solidFill>
                 <a:hlinkClick r:id="rId9"/>
               </a:rPr>
-              <a:t>https://github.com/jwooley/RoslynAndYou</a:t>
+              <a:t>https://github.com/jwooley/CSVersions</a:t>
             </a:r>
             <a:r>
               <a:rPr lang="en-US" cap="small" dirty="0">
@@ -32063,7 +31932,7 @@
 </p:sld>
 </file>
 
-<file path=ppt/slides/slide8.xml><?xml version="1.0" encoding="utf-8"?>
+<file path=ppt/slides/slide9.xml><?xml version="1.0" encoding="utf-8"?>
 <p:sld xmlns:a="http://schemas.openxmlformats.org/drawingml/2006/main" xmlns:r="http://schemas.openxmlformats.org/officeDocument/2006/relationships" xmlns:p="http://schemas.openxmlformats.org/presentationml/2006/main">
   <p:cSld>
     <p:spTree>
@@ -32550,7 +32419,16 @@
                 <a:latin typeface="Segoe UI" panose="020B0502040204020203" pitchFamily="34" charset="0"/>
                 <a:hlinkClick r:id="rId6"/>
               </a:rPr>
-              <a:t>https://github.com/jwooley/RoslynAndYou</a:t>
+              <a:t>https://github.com/jwooley/CSVersions</a:t>
+            </a:r>
+            <a:r>
+              <a:rPr lang="en-US" sz="2200" dirty="0">
+                <a:solidFill>
+                  <a:schemeClr val="tx1"/>
+                </a:solidFill>
+                <a:latin typeface="Segoe UI" panose="020B0502040204020203" pitchFamily="34" charset="0"/>
+              </a:rPr>
+              <a:t> </a:t>
             </a:r>
             <a:br>
               <a:rPr lang="en-US" sz="2200" dirty="0">

</xml_diff>

<commit_message>
Update to .Net 8 and misc other changes.
</commit_message>
<xml_diff>
--- a/CSPastPresentFuture.pptx
+++ b/CSPastPresentFuture.pptx
@@ -17,7 +17,7 @@
     <p:sldId id="318" r:id="rId8"/>
     <p:sldId id="319" r:id="rId9"/>
     <p:sldId id="263" r:id="rId10"/>
-    <p:sldId id="287" r:id="rId11"/>
+    <p:sldId id="325" r:id="rId11"/>
   </p:sldIdLst>
   <p:sldSz cx="12192000" cy="6858000"/>
   <p:notesSz cx="6858000" cy="9144000"/>
@@ -17854,7 +17854,7 @@
           <a:p>
             <a:fld id="{FC81B089-160E-404A-8C73-8674F1782EA4}" type="datetimeFigureOut">
               <a:rPr lang="en-US" smtClean="0"/>
-              <a:t>8/28/2023</a:t>
+              <a:t>10/10/2023</a:t>
             </a:fld>
             <a:endParaRPr lang="en-US"/>
           </a:p>
@@ -20922,7 +20922,7 @@
           <a:p>
             <a:fld id="{D2B62928-2648-4210-B25C-2BD7B5FE2C7B}" type="datetimeFigureOut">
               <a:rPr lang="en-US" smtClean="0"/>
-              <a:t>8/28/2023</a:t>
+              <a:t>10/10/2023</a:t>
             </a:fld>
             <a:endParaRPr lang="en-US"/>
           </a:p>
@@ -21433,7 +21433,7 @@
           <a:p>
             <a:fld id="{D2B62928-2648-4210-B25C-2BD7B5FE2C7B}" type="datetimeFigureOut">
               <a:rPr lang="en-US" smtClean="0"/>
-              <a:t>8/28/2023</a:t>
+              <a:t>10/10/2023</a:t>
             </a:fld>
             <a:endParaRPr lang="en-US"/>
           </a:p>
@@ -21606,7 +21606,7 @@
           <a:p>
             <a:fld id="{D2B62928-2648-4210-B25C-2BD7B5FE2C7B}" type="datetimeFigureOut">
               <a:rPr lang="en-US" smtClean="0"/>
-              <a:t>8/28/2023</a:t>
+              <a:t>10/10/2023</a:t>
             </a:fld>
             <a:endParaRPr lang="en-US"/>
           </a:p>
@@ -21770,7 +21770,7 @@
           <a:p>
             <a:fld id="{D2B62928-2648-4210-B25C-2BD7B5FE2C7B}" type="datetimeFigureOut">
               <a:rPr lang="en-US" smtClean="0"/>
-              <a:t>8/28/2023</a:t>
+              <a:t>10/10/2023</a:t>
             </a:fld>
             <a:endParaRPr lang="en-US"/>
           </a:p>
@@ -24893,7 +24893,7 @@
           <a:p>
             <a:fld id="{D2B62928-2648-4210-B25C-2BD7B5FE2C7B}" type="datetimeFigureOut">
               <a:rPr lang="en-US" smtClean="0"/>
-              <a:t>8/28/2023</a:t>
+              <a:t>10/10/2023</a:t>
             </a:fld>
             <a:endParaRPr lang="en-US"/>
           </a:p>
@@ -25173,7 +25173,7 @@
           <a:p>
             <a:fld id="{D2B62928-2648-4210-B25C-2BD7B5FE2C7B}" type="datetimeFigureOut">
               <a:rPr lang="en-US" smtClean="0"/>
-              <a:t>8/28/2023</a:t>
+              <a:t>10/10/2023</a:t>
             </a:fld>
             <a:endParaRPr lang="en-US"/>
           </a:p>
@@ -25587,7 +25587,7 @@
           <a:p>
             <a:fld id="{D2B62928-2648-4210-B25C-2BD7B5FE2C7B}" type="datetimeFigureOut">
               <a:rPr lang="en-US" smtClean="0"/>
-              <a:t>8/28/2023</a:t>
+              <a:t>10/10/2023</a:t>
             </a:fld>
             <a:endParaRPr lang="en-US"/>
           </a:p>
@@ -25699,7 +25699,7 @@
           <a:p>
             <a:fld id="{D2B62928-2648-4210-B25C-2BD7B5FE2C7B}" type="datetimeFigureOut">
               <a:rPr lang="en-US" smtClean="0"/>
-              <a:t>8/28/2023</a:t>
+              <a:t>10/10/2023</a:t>
             </a:fld>
             <a:endParaRPr lang="en-US"/>
           </a:p>
@@ -25789,7 +25789,7 @@
           <a:p>
             <a:fld id="{D2B62928-2648-4210-B25C-2BD7B5FE2C7B}" type="datetimeFigureOut">
               <a:rPr lang="en-US" smtClean="0"/>
-              <a:t>8/28/2023</a:t>
+              <a:t>10/10/2023</a:t>
             </a:fld>
             <a:endParaRPr lang="en-US"/>
           </a:p>
@@ -25964,7 +25964,7 @@
           <a:p>
             <a:fld id="{D2B62928-2648-4210-B25C-2BD7B5FE2C7B}" type="datetimeFigureOut">
               <a:rPr lang="en-US" smtClean="0"/>
-              <a:t>8/28/2023</a:t>
+              <a:t>10/10/2023</a:t>
             </a:fld>
             <a:endParaRPr lang="en-US"/>
           </a:p>
@@ -26449,7 +26449,7 @@
           <a:p>
             <a:fld id="{D2B62928-2648-4210-B25C-2BD7B5FE2C7B}" type="datetimeFigureOut">
               <a:rPr lang="en-US" smtClean="0"/>
-              <a:t>8/28/2023</a:t>
+              <a:t>10/10/2023</a:t>
             </a:fld>
             <a:endParaRPr lang="en-US"/>
           </a:p>
@@ -27001,7 +27001,7 @@
           <a:p>
             <a:fld id="{D2B62928-2648-4210-B25C-2BD7B5FE2C7B}" type="datetimeFigureOut">
               <a:rPr lang="en-US" smtClean="0"/>
-              <a:t>8/28/2023</a:t>
+              <a:t>10/10/2023</a:t>
             </a:fld>
             <a:endParaRPr lang="en-US"/>
           </a:p>
@@ -27421,13 +27421,13 @@
             <a:spLocks noGrp="1"/>
           </p:cNvSpPr>
           <p:nvPr>
-            <p:ph type="ctrTitle"/>
+            <p:ph type="ctrTitle" idx="4294967295"/>
           </p:nvPr>
         </p:nvSpPr>
         <p:spPr>
           <a:xfrm>
-            <a:off x="1828800" y="2133600"/>
-            <a:ext cx="8153400" cy="2090065"/>
+            <a:off x="2133600" y="2383631"/>
+            <a:ext cx="8153400" cy="2090738"/>
           </a:xfrm>
           <a:solidFill>
             <a:srgbClr val="000000">
@@ -27465,7 +27465,7 @@
                   <a:schemeClr val="tx1"/>
                 </a:solidFill>
               </a:rPr>
-              <a:t>C# Past Present and beyond</a:t>
+              <a:t>C#, Past, Present and Future</a:t>
             </a:r>
             <a:br>
               <a:rPr lang="en-US" cap="small" dirty="0">
@@ -27892,6 +27892,101 @@
           <a:chExt cx="0" cy="0"/>
         </a:xfrm>
       </p:grpSpPr>
+      <p:sp>
+        <p:nvSpPr>
+          <p:cNvPr id="2" name="Title 1"/>
+          <p:cNvSpPr>
+            <a:spLocks noGrp="1"/>
+          </p:cNvSpPr>
+          <p:nvPr>
+            <p:ph type="ctrTitle" idx="4294967295"/>
+          </p:nvPr>
+        </p:nvSpPr>
+        <p:spPr>
+          <a:xfrm>
+            <a:off x="2133600" y="2383631"/>
+            <a:ext cx="8153400" cy="2090738"/>
+          </a:xfrm>
+          <a:solidFill>
+            <a:srgbClr val="000000">
+              <a:alpha val="69804"/>
+            </a:srgbClr>
+          </a:solidFill>
+          <a:effectLst>
+            <a:softEdge rad="63500"/>
+          </a:effectLst>
+        </p:spPr>
+        <p:style>
+          <a:lnRef idx="1">
+            <a:schemeClr val="accent1"/>
+          </a:lnRef>
+          <a:fillRef idx="2">
+            <a:schemeClr val="accent1"/>
+          </a:fillRef>
+          <a:effectRef idx="1">
+            <a:schemeClr val="accent1"/>
+          </a:effectRef>
+          <a:fontRef idx="minor">
+            <a:schemeClr val="dk1"/>
+          </a:fontRef>
+        </p:style>
+        <p:txBody>
+          <a:bodyPr anchor="ctr">
+            <a:normAutofit fontScale="90000"/>
+          </a:bodyPr>
+          <a:lstStyle/>
+          <a:p>
+            <a:pPr algn="ctr"/>
+            <a:r>
+              <a:rPr lang="en-US" cap="small" dirty="0">
+                <a:solidFill>
+                  <a:schemeClr val="tx1"/>
+                </a:solidFill>
+              </a:rPr>
+              <a:t>C#, Past, Present </a:t>
+            </a:r>
+            <a:r>
+              <a:rPr lang="en-US" cap="small">
+                <a:solidFill>
+                  <a:schemeClr val="tx1"/>
+                </a:solidFill>
+              </a:rPr>
+              <a:t>and Future</a:t>
+            </a:r>
+            <a:br>
+              <a:rPr lang="en-US" cap="small" dirty="0">
+                <a:solidFill>
+                  <a:schemeClr val="tx1"/>
+                </a:solidFill>
+              </a:rPr>
+            </a:br>
+            <a:r>
+              <a:rPr lang="en-US" sz="3600" dirty="0">
+                <a:solidFill>
+                  <a:schemeClr val="tx1"/>
+                </a:solidFill>
+                <a:latin typeface="Segoe UI" panose="020B0502040204020203" pitchFamily="34" charset="0"/>
+              </a:rPr>
+              <a:t>https://github.com/jwooley/CSVersions</a:t>
+            </a:r>
+            <a:br>
+              <a:rPr lang="en-US" dirty="0">
+                <a:solidFill>
+                  <a:schemeClr val="tx1"/>
+                </a:solidFill>
+              </a:rPr>
+            </a:br>
+            <a:r>
+              <a:rPr lang="en-US" dirty="0">
+                <a:solidFill>
+                  <a:schemeClr val="tx1"/>
+                </a:solidFill>
+              </a:rPr>
+              <a:t>https://jwooley.github.io/ </a:t>
+            </a:r>
+          </a:p>
+        </p:txBody>
+      </p:sp>
       <p:pic>
         <p:nvPicPr>
           <p:cNvPr id="5" name="Picture 2" descr="\\WOOLEYHOMESVR\Photos\MVP_Logo_Kit\MVP Logo Kit\MVP_FullColor_ForScreen.png"/>
@@ -27915,7 +28010,7 @@
         </p:blipFill>
         <p:spPr bwMode="auto">
           <a:xfrm>
-            <a:off x="10961040" y="12555"/>
+            <a:off x="10954414" y="16565"/>
             <a:ext cx="1230960" cy="1931970"/>
           </a:xfrm>
           <a:prstGeom prst="rect">
@@ -27956,7 +28051,7 @@
         </p:blipFill>
         <p:spPr bwMode="auto">
           <a:xfrm>
-            <a:off x="9360840" y="12555"/>
+            <a:off x="9347588" y="16565"/>
             <a:ext cx="1600200" cy="2005584"/>
           </a:xfrm>
           <a:prstGeom prst="rect">
@@ -27984,7 +28079,7 @@
         </p:nvSpPr>
         <p:spPr>
           <a:xfrm>
-            <a:off x="76200" y="5410642"/>
+            <a:off x="0" y="5462187"/>
             <a:ext cx="2895600" cy="1368798"/>
           </a:xfrm>
           <a:prstGeom prst="rect">
@@ -28205,12 +28300,9 @@
           <a:p>
             <a:pPr algn="r"/>
             <a:r>
-              <a:rPr lang="en-US" dirty="0">
-                <a:hlinkClick r:id="rId4"/>
-              </a:rPr>
+              <a:rPr lang="en-US" dirty="0"/>
               <a:t>www.ThinqLinq.com</a:t>
             </a:r>
-            <a:endParaRPr lang="en-US" dirty="0"/>
           </a:p>
           <a:p>
             <a:pPr algn="r"/>
@@ -28226,161 +28318,40 @@
           </a:p>
         </p:txBody>
       </p:sp>
-      <p:sp>
-        <p:nvSpPr>
-          <p:cNvPr id="11" name="Title 1"/>
-          <p:cNvSpPr>
-            <a:spLocks noGrp="1"/>
-          </p:cNvSpPr>
-          <p:nvPr>
-            <p:ph type="ctrTitle"/>
-          </p:nvPr>
-        </p:nvSpPr>
+      <p:pic>
+        <p:nvPicPr>
+          <p:cNvPr id="10" name="Picture 9">
+            <a:extLst>
+              <a:ext uri="{FF2B5EF4-FFF2-40B4-BE49-F238E27FC236}">
+                <a16:creationId xmlns:a16="http://schemas.microsoft.com/office/drawing/2014/main" id="{3CB934DF-A375-4CF4-9006-A23354D7231E}"/>
+              </a:ext>
+            </a:extLst>
+          </p:cNvPr>
+          <p:cNvPicPr>
+            <a:picLocks noChangeAspect="1"/>
+          </p:cNvPicPr>
+          <p:nvPr/>
+        </p:nvPicPr>
+        <p:blipFill>
+          <a:blip r:embed="rId4"/>
+          <a:stretch>
+            <a:fillRect/>
+          </a:stretch>
+        </p:blipFill>
         <p:spPr>
           <a:xfrm>
-            <a:off x="2590800" y="2133600"/>
-            <a:ext cx="7848600" cy="2362200"/>
+            <a:off x="228600" y="272532"/>
+            <a:ext cx="1447925" cy="1493649"/>
           </a:xfrm>
-          <a:solidFill>
-            <a:srgbClr val="000000">
-              <a:alpha val="69804"/>
-            </a:srgbClr>
-          </a:solidFill>
-          <a:effectLst>
-            <a:softEdge rad="63500"/>
-          </a:effectLst>
+          <a:prstGeom prst="rect">
+            <a:avLst/>
+          </a:prstGeom>
         </p:spPr>
-        <p:style>
-          <a:lnRef idx="1">
-            <a:schemeClr val="accent1"/>
-          </a:lnRef>
-          <a:fillRef idx="2">
-            <a:schemeClr val="accent1"/>
-          </a:fillRef>
-          <a:effectRef idx="1">
-            <a:schemeClr val="accent1"/>
-          </a:effectRef>
-          <a:fontRef idx="minor">
-            <a:schemeClr val="dk1"/>
-          </a:fontRef>
-        </p:style>
-        <p:txBody>
-          <a:bodyPr anchor="ctr">
-            <a:normAutofit fontScale="90000"/>
-          </a:bodyPr>
-          <a:lstStyle/>
-          <a:p>
-            <a:pPr algn="ctr"/>
-            <a:r>
-              <a:rPr lang="en-US" cap="small" dirty="0" err="1">
-                <a:solidFill>
-                  <a:schemeClr val="tx1"/>
-                </a:solidFill>
-              </a:rPr>
-              <a:t>.Net</a:t>
-            </a:r>
-            <a:r>
-              <a:rPr lang="en-US" cap="small" dirty="0">
-                <a:solidFill>
-                  <a:schemeClr val="tx1"/>
-                </a:solidFill>
-              </a:rPr>
-              <a:t> Compiler Platform</a:t>
-            </a:r>
-            <a:br>
-              <a:rPr lang="en-US" cap="small" dirty="0">
-                <a:solidFill>
-                  <a:schemeClr val="tx1"/>
-                </a:solidFill>
-              </a:rPr>
-            </a:br>
-            <a:r>
-              <a:rPr lang="en-US" cap="small" dirty="0">
-                <a:solidFill>
-                  <a:schemeClr val="tx1"/>
-                </a:solidFill>
-              </a:rPr>
-              <a:t>(Roslyn)</a:t>
-            </a:r>
-            <a:br>
-              <a:rPr lang="en-US" cap="small" dirty="0">
-                <a:solidFill>
-                  <a:schemeClr val="tx1"/>
-                </a:solidFill>
-              </a:rPr>
-            </a:br>
-            <a:r>
-              <a:rPr lang="en-US" cap="small" dirty="0">
-                <a:solidFill>
-                  <a:schemeClr val="tx1"/>
-                </a:solidFill>
-              </a:rPr>
-              <a:t>And You</a:t>
-            </a:r>
-            <a:br>
-              <a:rPr lang="en-US" cap="small" dirty="0">
-                <a:solidFill>
-                  <a:schemeClr val="tx1"/>
-                </a:solidFill>
-              </a:rPr>
-            </a:br>
-            <a:r>
-              <a:rPr lang="en-US" sz="2200" dirty="0">
-                <a:solidFill>
-                  <a:schemeClr val="tx1"/>
-                </a:solidFill>
-                <a:latin typeface="Segoe UI" panose="020B0502040204020203" pitchFamily="34" charset="0"/>
-                <a:hlinkClick r:id="rId5"/>
-              </a:rPr>
-              <a:t>https://github.com/jwooley/CSVersions</a:t>
-            </a:r>
-            <a:r>
-              <a:rPr lang="en-US" sz="2200" dirty="0">
-                <a:solidFill>
-                  <a:schemeClr val="tx1"/>
-                </a:solidFill>
-                <a:latin typeface="Segoe UI" panose="020B0502040204020203" pitchFamily="34" charset="0"/>
-              </a:rPr>
-              <a:t> </a:t>
-            </a:r>
-            <a:br>
-              <a:rPr lang="en-US" sz="2200" dirty="0">
-                <a:solidFill>
-                  <a:schemeClr val="tx1"/>
-                </a:solidFill>
-                <a:latin typeface="Segoe UI" panose="020B0502040204020203" pitchFamily="34" charset="0"/>
-              </a:rPr>
-            </a:br>
-            <a:r>
-              <a:rPr lang="en-US" sz="2400" dirty="0">
-                <a:solidFill>
-                  <a:schemeClr val="tx1"/>
-                </a:solidFill>
-                <a:hlinkClick r:id="rId6"/>
-              </a:rPr>
-              <a:t>https://jwooley.github.io</a:t>
-            </a:r>
-            <a:r>
-              <a:rPr lang="en-US" sz="2400" cap="small" dirty="0">
-                <a:solidFill>
-                  <a:schemeClr val="tx1"/>
-                </a:solidFill>
-                <a:hlinkClick r:id="rId6"/>
-              </a:rPr>
-              <a:t>/</a:t>
-            </a:r>
-            <a:endParaRPr lang="en-US" sz="2200" cap="small" dirty="0">
-              <a:solidFill>
-                <a:schemeClr val="tx1"/>
-              </a:solidFill>
-            </a:endParaRPr>
-          </a:p>
-        </p:txBody>
-      </p:sp>
+      </p:pic>
     </p:spTree>
     <p:extLst>
       <p:ext uri="{BB962C8B-B14F-4D97-AF65-F5344CB8AC3E}">
-        <p14:creationId xmlns:p14="http://schemas.microsoft.com/office/powerpoint/2010/main" val="2613547704"/>
+        <p14:creationId xmlns:p14="http://schemas.microsoft.com/office/powerpoint/2010/main" val="1529520529"/>
       </p:ext>
     </p:extLst>
   </p:cSld>

</xml_diff>